<commit_message>
Hopefully Last Commit before the presentation
</commit_message>
<xml_diff>
--- a/Documentation/BELLZA WEBAPP.pptx
+++ b/Documentation/BELLZA WEBAPP.pptx
@@ -27,8 +27,8 @@
     <p:sldId id="273" r:id="rId18"/>
     <p:sldId id="274" r:id="rId19"/>
     <p:sldId id="275" r:id="rId20"/>
-    <p:sldId id="283" r:id="rId21"/>
-    <p:sldId id="278" r:id="rId22"/>
+    <p:sldId id="278" r:id="rId21"/>
+    <p:sldId id="283" r:id="rId22"/>
   </p:sldIdLst>
   <p:sldSz cx="12192000" cy="6858000"/>
   <p:notesSz cx="6858000" cy="9144000"/>
@@ -916,7 +916,7 @@
           <a:effectLst/>
           <a:extLst>
             <a:ext uri="{91240B29-F687-4f45-9708-019B960494DF}">
-              <a14:hiddenLine xmlns:a14="http://schemas.microsoft.com/office/drawing/2010/main" xmlns="" w="9525">
+              <a14:hiddenLine xmlns="" xmlns:a14="http://schemas.microsoft.com/office/drawing/2010/main" w="9525">
                 <a:solidFill>
                   <a:srgbClr val="000000"/>
                 </a:solidFill>
@@ -2439,7 +2439,7 @@
           <a:ln/>
           <a:extLst>
             <a:ext uri="{91240B29-F687-4f45-9708-019B960494DF}">
-              <a14:hiddenLine xmlns:a14="http://schemas.microsoft.com/office/drawing/2010/main" xmlns="" w="9525">
+              <a14:hiddenLine xmlns="" xmlns:a14="http://schemas.microsoft.com/office/drawing/2010/main" w="9525">
                 <a:solidFill>
                   <a:srgbClr val="000000"/>
                 </a:solidFill>
@@ -2714,7 +2714,7 @@
           <a:ln/>
           <a:extLst>
             <a:ext uri="{91240B29-F687-4f45-9708-019B960494DF}">
-              <a14:hiddenLine xmlns:a14="http://schemas.microsoft.com/office/drawing/2010/main" xmlns="" w="9525">
+              <a14:hiddenLine xmlns="" xmlns:a14="http://schemas.microsoft.com/office/drawing/2010/main" w="9525">
                 <a:solidFill>
                   <a:srgbClr val="000000"/>
                 </a:solidFill>
@@ -2997,7 +2997,7 @@
           <a:ln/>
           <a:extLst>
             <a:ext uri="{91240B29-F687-4f45-9708-019B960494DF}">
-              <a14:hiddenLine xmlns:a14="http://schemas.microsoft.com/office/drawing/2010/main" xmlns="" w="9525">
+              <a14:hiddenLine xmlns="" xmlns:a14="http://schemas.microsoft.com/office/drawing/2010/main" w="9525">
                 <a:solidFill>
                   <a:srgbClr val="000000"/>
                 </a:solidFill>
@@ -3623,7 +3623,7 @@
           <a:ln/>
           <a:extLst>
             <a:ext uri="{91240B29-F687-4f45-9708-019B960494DF}">
-              <a14:hiddenLine xmlns:a14="http://schemas.microsoft.com/office/drawing/2010/main" xmlns="" w="9525">
+              <a14:hiddenLine xmlns="" xmlns:a14="http://schemas.microsoft.com/office/drawing/2010/main" w="9525">
                 <a:solidFill>
                   <a:srgbClr val="000000"/>
                 </a:solidFill>
@@ -3962,7 +3962,7 @@
           <a:ln/>
           <a:extLst>
             <a:ext uri="{91240B29-F687-4f45-9708-019B960494DF}">
-              <a14:hiddenLine xmlns:a14="http://schemas.microsoft.com/office/drawing/2010/main" xmlns="" w="9525">
+              <a14:hiddenLine xmlns="" xmlns:a14="http://schemas.microsoft.com/office/drawing/2010/main" w="9525">
                 <a:solidFill>
                   <a:srgbClr val="000000"/>
                 </a:solidFill>
@@ -4439,7 +4439,7 @@
           <a:ln/>
           <a:extLst>
             <a:ext uri="{91240B29-F687-4f45-9708-019B960494DF}">
-              <a14:hiddenLine xmlns:a14="http://schemas.microsoft.com/office/drawing/2010/main" xmlns="" w="9525">
+              <a14:hiddenLine xmlns="" xmlns:a14="http://schemas.microsoft.com/office/drawing/2010/main" w="9525">
                 <a:solidFill>
                   <a:srgbClr val="000000"/>
                 </a:solidFill>
@@ -4868,7 +4868,7 @@
           <a:ln/>
           <a:extLst>
             <a:ext uri="{91240B29-F687-4f45-9708-019B960494DF}">
-              <a14:hiddenLine xmlns:a14="http://schemas.microsoft.com/office/drawing/2010/main" xmlns="" w="9525">
+              <a14:hiddenLine xmlns="" xmlns:a14="http://schemas.microsoft.com/office/drawing/2010/main" w="9525">
                 <a:solidFill>
                   <a:srgbClr val="000000"/>
                 </a:solidFill>
@@ -6137,21 +6137,21 @@
         <p:spPr/>
         <p:txBody>
           <a:bodyPr>
-            <a:normAutofit fontScale="47500" lnSpcReduction="20000"/>
+            <a:noAutofit/>
           </a:bodyPr>
           <a:lstStyle/>
           <a:p>
             <a:r>
-              <a:rPr lang="en-IN" dirty="0" smtClean="0"/>
+              <a:rPr lang="en-IN" sz="1400" dirty="0" smtClean="0"/>
               <a:t>Software Engineering final presentation</a:t>
             </a:r>
           </a:p>
           <a:p>
             <a:r>
-              <a:rPr lang="en-IN" dirty="0" smtClean="0"/>
+              <a:rPr lang="en-IN" sz="1400" dirty="0" smtClean="0"/>
               <a:t>Group 9</a:t>
             </a:r>
-            <a:endParaRPr lang="en-IN" dirty="0"/>
+            <a:endParaRPr lang="en-IN" sz="1400" dirty="0"/>
           </a:p>
         </p:txBody>
       </p:sp>
@@ -6165,6 +6165,13 @@
   <p:clrMapOvr>
     <a:masterClrMapping/>
   </p:clrMapOvr>
+  <p:timing>
+    <p:tnLst>
+      <p:par>
+        <p:cTn id="1" dur="indefinite" restart="never" nodeType="tmRoot"/>
+      </p:par>
+    </p:tnLst>
+  </p:timing>
 </p:sld>
 </file>
 
@@ -7145,8 +7152,8 @@
           </a:p>
           <a:p>
             <a:r>
-              <a:rPr lang="en-IN" dirty="0" err="1" smtClean="0"/>
-              <a:t>Smartdraw</a:t>
+              <a:rPr lang="en-IN" dirty="0" smtClean="0"/>
+              <a:t>Smart draw</a:t>
             </a:r>
             <a:endParaRPr lang="en-IN" dirty="0" smtClean="0"/>
           </a:p>
@@ -7277,15 +7284,7 @@
           <a:p>
             <a:r>
               <a:rPr lang="en-IN" dirty="0" smtClean="0"/>
-              <a:t>Changing the code as </a:t>
-            </a:r>
-            <a:r>
-              <a:rPr lang="en-IN" dirty="0" smtClean="0"/>
-              <a:t>per </a:t>
-            </a:r>
-            <a:r>
-              <a:rPr lang="en-IN" dirty="0" smtClean="0"/>
-              <a:t>client request</a:t>
+              <a:t>Changing the code as per client request</a:t>
             </a:r>
           </a:p>
           <a:p>
@@ -7417,7 +7416,19 @@
           <a:p>
             <a:r>
               <a:rPr lang="en-IN" dirty="0" smtClean="0"/>
-              <a:t>Goals: The goal of this application is to ease the process of booking saloon appointments in a very effective manner.</a:t>
+              <a:t>Goals: The goal of this application is to ease the process of booking saloon appointments in a very effective </a:t>
+            </a:r>
+            <a:r>
+              <a:rPr lang="en-IN" dirty="0" smtClean="0"/>
+              <a:t>and reliable </a:t>
+            </a:r>
+            <a:r>
+              <a:rPr lang="en-IN" dirty="0" smtClean="0"/>
+              <a:t>manner</a:t>
+            </a:r>
+            <a:r>
+              <a:rPr lang="en-IN" dirty="0" smtClean="0"/>
+              <a:t>.</a:t>
             </a:r>
           </a:p>
           <a:p>
@@ -7438,6 +7449,13 @@
   <p:clrMapOvr>
     <a:masterClrMapping/>
   </p:clrMapOvr>
+  <p:timing>
+    <p:tnLst>
+      <p:par>
+        <p:cTn id="1" dur="indefinite" restart="never" nodeType="tmRoot"/>
+      </p:par>
+    </p:tnLst>
+  </p:timing>
 </p:sld>
 </file>
 
@@ -7460,7 +7478,7 @@
       </p:grpSpPr>
       <p:sp>
         <p:nvSpPr>
-          <p:cNvPr id="4" name="Title 3"/>
+          <p:cNvPr id="2" name="Title 1"/>
           <p:cNvSpPr>
             <a:spLocks noGrp="1"/>
           </p:cNvSpPr>
@@ -7473,44 +7491,116 @@
           <a:bodyPr/>
           <a:lstStyle/>
           <a:p>
-            <a:pPr algn="ctr"/>
-            <a:r>
-              <a:rPr lang="en-IN" sz="8000" dirty="0" smtClean="0">
-                <a:latin typeface="Aharoni" panose="02010803020104030203" pitchFamily="2" charset="-79"/>
-                <a:cs typeface="Aharoni" panose="02010803020104030203" pitchFamily="2" charset="-79"/>
-              </a:rPr>
-              <a:t>THANK YOU</a:t>
-            </a:r>
-            <a:endParaRPr lang="en-IN" sz="8000" dirty="0">
-              <a:latin typeface="Aharoni" panose="02010803020104030203" pitchFamily="2" charset="-79"/>
-              <a:cs typeface="Aharoni" panose="02010803020104030203" pitchFamily="2" charset="-79"/>
-            </a:endParaRPr>
-          </a:p>
-        </p:txBody>
-      </p:sp>
-      <p:sp>
-        <p:nvSpPr>
-          <p:cNvPr id="5" name="Subtitle 4"/>
-          <p:cNvSpPr>
-            <a:spLocks noGrp="1"/>
-          </p:cNvSpPr>
-          <p:nvPr>
-            <p:ph type="body" idx="1"/>
-          </p:nvPr>
-        </p:nvSpPr>
-        <p:spPr/>
-        <p:txBody>
-          <a:bodyPr/>
-          <a:lstStyle/>
-          <a:p>
-            <a:endParaRPr lang="en-IN"/>
+            <a:r>
+              <a:rPr lang="en-IN" dirty="0" smtClean="0"/>
+              <a:t>Future aspects </a:t>
+            </a:r>
+            <a:endParaRPr lang="en-IN" dirty="0"/>
+          </a:p>
+        </p:txBody>
+      </p:sp>
+      <p:sp>
+        <p:nvSpPr>
+          <p:cNvPr id="3" name="Content Placeholder 2"/>
+          <p:cNvSpPr>
+            <a:spLocks noGrp="1"/>
+          </p:cNvSpPr>
+          <p:nvPr>
+            <p:ph idx="1"/>
+          </p:nvPr>
+        </p:nvSpPr>
+        <p:spPr>
+          <a:xfrm>
+            <a:off x="818712" y="2393203"/>
+            <a:ext cx="10554574" cy="3636511"/>
+          </a:xfrm>
+        </p:spPr>
+        <p:txBody>
+          <a:bodyPr>
+            <a:normAutofit fontScale="92500" lnSpcReduction="10000"/>
+          </a:bodyPr>
+          <a:lstStyle/>
+          <a:p>
+            <a:r>
+              <a:rPr lang="en-IN" dirty="0" smtClean="0"/>
+              <a:t> Technical</a:t>
+            </a:r>
+          </a:p>
+          <a:p>
+            <a:pPr lvl="1"/>
+            <a:r>
+              <a:rPr lang="en-IN" dirty="0" smtClean="0"/>
+              <a:t>More secure and efficient environment</a:t>
+            </a:r>
+          </a:p>
+          <a:p>
+            <a:pPr lvl="1"/>
+            <a:r>
+              <a:rPr lang="en-IN" dirty="0" smtClean="0"/>
+              <a:t>Database upgrade</a:t>
+            </a:r>
+          </a:p>
+          <a:p>
+            <a:pPr lvl="1"/>
+            <a:r>
+              <a:rPr lang="en-IN" dirty="0" smtClean="0"/>
+              <a:t>Additional features</a:t>
+            </a:r>
+          </a:p>
+          <a:p>
+            <a:pPr lvl="2"/>
+            <a:r>
+              <a:rPr lang="en-IN" dirty="0" smtClean="0"/>
+              <a:t>Auto-suggestion, integrated payment, packages</a:t>
+            </a:r>
+          </a:p>
+          <a:p>
+            <a:r>
+              <a:rPr lang="en-IN" dirty="0" smtClean="0"/>
+              <a:t>Economical</a:t>
+            </a:r>
+          </a:p>
+          <a:p>
+            <a:pPr lvl="1"/>
+            <a:r>
+              <a:rPr lang="en-IN" dirty="0" smtClean="0"/>
+              <a:t>More feasible</a:t>
+            </a:r>
+          </a:p>
+          <a:p>
+            <a:pPr lvl="1"/>
+            <a:r>
+              <a:rPr lang="en-IN" dirty="0" smtClean="0"/>
+              <a:t>More user friendly</a:t>
+            </a:r>
+          </a:p>
+          <a:p>
+            <a:r>
+              <a:rPr lang="en-IN" dirty="0" smtClean="0"/>
+              <a:t>Privacy</a:t>
+            </a:r>
+          </a:p>
+          <a:p>
+            <a:pPr lvl="1"/>
+            <a:r>
+              <a:rPr lang="en-IN" dirty="0" smtClean="0"/>
+              <a:t>Becoming more independent</a:t>
+            </a:r>
+          </a:p>
+          <a:p>
+            <a:pPr lvl="1"/>
+            <a:r>
+              <a:rPr lang="en-IN" dirty="0" smtClean="0"/>
+              <a:t>Removing external reference and APIs usage</a:t>
+            </a:r>
+            <a:endParaRPr lang="en-IN" dirty="0"/>
           </a:p>
         </p:txBody>
       </p:sp>
     </p:spTree>
     <p:extLst>
       <p:ext uri="{BB962C8B-B14F-4D97-AF65-F5344CB8AC3E}">
-        <p14:creationId xmlns:p14="http://schemas.microsoft.com/office/powerpoint/2010/main" val="2584843175"/>
+        <p14:creationId xmlns:p14="http://schemas.microsoft.com/office/powerpoint/2010/main" val="2569788181"/>
       </p:ext>
     </p:extLst>
   </p:cSld>
@@ -7539,7 +7629,7 @@
       </p:grpSpPr>
       <p:sp>
         <p:nvSpPr>
-          <p:cNvPr id="2" name="Title 1"/>
+          <p:cNvPr id="4" name="Title 3"/>
           <p:cNvSpPr>
             <a:spLocks noGrp="1"/>
           </p:cNvSpPr>
@@ -7552,116 +7642,44 @@
           <a:bodyPr/>
           <a:lstStyle/>
           <a:p>
-            <a:r>
-              <a:rPr lang="en-IN" dirty="0" smtClean="0"/>
-              <a:t>Future aspects </a:t>
-            </a:r>
-            <a:endParaRPr lang="en-IN" dirty="0"/>
-          </a:p>
-        </p:txBody>
-      </p:sp>
-      <p:sp>
-        <p:nvSpPr>
-          <p:cNvPr id="3" name="Content Placeholder 2"/>
-          <p:cNvSpPr>
-            <a:spLocks noGrp="1"/>
-          </p:cNvSpPr>
-          <p:nvPr>
-            <p:ph idx="1"/>
-          </p:nvPr>
-        </p:nvSpPr>
-        <p:spPr>
-          <a:xfrm>
-            <a:off x="818712" y="2393203"/>
-            <a:ext cx="10554574" cy="3636511"/>
-          </a:xfrm>
-        </p:spPr>
-        <p:txBody>
-          <a:bodyPr>
-            <a:normAutofit fontScale="92500" lnSpcReduction="10000"/>
-          </a:bodyPr>
-          <a:lstStyle/>
-          <a:p>
-            <a:r>
-              <a:rPr lang="en-IN" dirty="0" smtClean="0"/>
-              <a:t> Technical</a:t>
-            </a:r>
-          </a:p>
-          <a:p>
-            <a:pPr lvl="1"/>
-            <a:r>
-              <a:rPr lang="en-IN" dirty="0" smtClean="0"/>
-              <a:t>More secure and efficient environment</a:t>
-            </a:r>
-          </a:p>
-          <a:p>
-            <a:pPr lvl="1"/>
-            <a:r>
-              <a:rPr lang="en-IN" dirty="0" smtClean="0"/>
-              <a:t>Database upgrade</a:t>
-            </a:r>
-          </a:p>
-          <a:p>
-            <a:pPr lvl="1"/>
-            <a:r>
-              <a:rPr lang="en-IN" dirty="0" smtClean="0"/>
-              <a:t>Additional features</a:t>
-            </a:r>
-          </a:p>
-          <a:p>
-            <a:pPr lvl="2"/>
-            <a:r>
-              <a:rPr lang="en-IN" dirty="0" smtClean="0"/>
-              <a:t>Auto-suggestion, integrated payment, packages</a:t>
-            </a:r>
-          </a:p>
-          <a:p>
-            <a:r>
-              <a:rPr lang="en-IN" dirty="0" smtClean="0"/>
-              <a:t>Economical</a:t>
-            </a:r>
-          </a:p>
-          <a:p>
-            <a:pPr lvl="1"/>
-            <a:r>
-              <a:rPr lang="en-IN" dirty="0" smtClean="0"/>
-              <a:t>More feasible</a:t>
-            </a:r>
-          </a:p>
-          <a:p>
-            <a:pPr lvl="1"/>
-            <a:r>
-              <a:rPr lang="en-IN" dirty="0" smtClean="0"/>
-              <a:t>More user friendly</a:t>
-            </a:r>
-          </a:p>
-          <a:p>
-            <a:r>
-              <a:rPr lang="en-IN" dirty="0" smtClean="0"/>
-              <a:t>Privacy</a:t>
-            </a:r>
-          </a:p>
-          <a:p>
-            <a:pPr lvl="1"/>
-            <a:r>
-              <a:rPr lang="en-IN" dirty="0" smtClean="0"/>
-              <a:t>Becoming more independent</a:t>
-            </a:r>
-          </a:p>
-          <a:p>
-            <a:pPr lvl="1"/>
-            <a:r>
-              <a:rPr lang="en-IN" dirty="0" smtClean="0"/>
-              <a:t>Removing external reference and APIs usage</a:t>
-            </a:r>
-            <a:endParaRPr lang="en-IN" dirty="0"/>
+            <a:pPr algn="ctr"/>
+            <a:r>
+              <a:rPr lang="en-IN" sz="8000" dirty="0" smtClean="0">
+                <a:latin typeface="Aharoni" panose="02010803020104030203" pitchFamily="2" charset="-79"/>
+                <a:cs typeface="Aharoni" panose="02010803020104030203" pitchFamily="2" charset="-79"/>
+              </a:rPr>
+              <a:t>THANK YOU</a:t>
+            </a:r>
+            <a:endParaRPr lang="en-IN" sz="8000" dirty="0">
+              <a:latin typeface="Aharoni" panose="02010803020104030203" pitchFamily="2" charset="-79"/>
+              <a:cs typeface="Aharoni" panose="02010803020104030203" pitchFamily="2" charset="-79"/>
+            </a:endParaRPr>
+          </a:p>
+        </p:txBody>
+      </p:sp>
+      <p:sp>
+        <p:nvSpPr>
+          <p:cNvPr id="5" name="Subtitle 4"/>
+          <p:cNvSpPr>
+            <a:spLocks noGrp="1"/>
+          </p:cNvSpPr>
+          <p:nvPr>
+            <p:ph type="body" idx="1"/>
+          </p:nvPr>
+        </p:nvSpPr>
+        <p:spPr/>
+        <p:txBody>
+          <a:bodyPr/>
+          <a:lstStyle/>
+          <a:p>
+            <a:endParaRPr lang="en-IN"/>
           </a:p>
         </p:txBody>
       </p:sp>
     </p:spTree>
     <p:extLst>
       <p:ext uri="{BB962C8B-B14F-4D97-AF65-F5344CB8AC3E}">
-        <p14:creationId xmlns:p14="http://schemas.microsoft.com/office/powerpoint/2010/main" val="2569788181"/>
+        <p14:creationId xmlns:p14="http://schemas.microsoft.com/office/powerpoint/2010/main" val="2584843175"/>
       </p:ext>
     </p:extLst>
   </p:cSld>
@@ -7742,6 +7760,13 @@
   <p:clrMapOvr>
     <a:masterClrMapping/>
   </p:clrMapOvr>
+  <p:timing>
+    <p:tnLst>
+      <p:par>
+        <p:cTn id="1" dur="indefinite" restart="never" nodeType="tmRoot"/>
+      </p:par>
+    </p:tnLst>
+  </p:timing>
 </p:sld>
 </file>
 
@@ -7900,14 +7925,14 @@
             <p:ph idx="1"/>
             <p:extLst>
               <p:ext uri="{D42A27DB-BD31-4B8C-83A1-F6EECF244321}">
-                <p14:modId xmlns:p14="http://schemas.microsoft.com/office/powerpoint/2010/main" val="781805098"/>
+                <p14:modId xmlns:p14="http://schemas.microsoft.com/office/powerpoint/2010/main" val="2894945346"/>
               </p:ext>
             </p:extLst>
           </p:nvPr>
         </p:nvGraphicFramePr>
         <p:xfrm>
-          <a:off x="810000" y="2495965"/>
-          <a:ext cx="10553700" cy="3411148"/>
+          <a:off x="810000" y="3067939"/>
+          <a:ext cx="10553700" cy="2696174"/>
         </p:xfrm>
         <a:graphic>
           <a:graphicData uri="http://schemas.openxmlformats.org/drawingml/2006/table">
@@ -7922,7 +7947,7 @@
                 <a:gridCol w="2110740"/>
                 <a:gridCol w="2110740"/>
               </a:tblGrid>
-              <a:tr h="647047">
+              <a:tr h="562182">
                 <a:tc>
                   <a:txBody>
                     <a:bodyPr/>
@@ -8250,58 +8275,6 @@
                   <a:tcPr marL="94305" marR="94305"/>
                 </a:tc>
               </a:tr>
-              <a:tr h="647047">
-                <a:tc>
-                  <a:txBody>
-                    <a:bodyPr/>
-                    <a:lstStyle/>
-                    <a:p>
-                      <a:endParaRPr lang="en-IN" sz="1600"/>
-                    </a:p>
-                  </a:txBody>
-                  <a:tcPr marL="94305" marR="94305"/>
-                </a:tc>
-                <a:tc>
-                  <a:txBody>
-                    <a:bodyPr/>
-                    <a:lstStyle/>
-                    <a:p>
-                      <a:endParaRPr lang="en-IN" sz="1600" dirty="0"/>
-                    </a:p>
-                  </a:txBody>
-                  <a:tcPr marL="94305" marR="94305"/>
-                </a:tc>
-                <a:tc>
-                  <a:txBody>
-                    <a:bodyPr/>
-                    <a:lstStyle/>
-                    <a:p>
-                      <a:endParaRPr lang="en-IN" sz="1600" dirty="0"/>
-                    </a:p>
-                  </a:txBody>
-                  <a:tcPr marL="94305" marR="94305"/>
-                </a:tc>
-                <a:tc>
-                  <a:txBody>
-                    <a:bodyPr/>
-                    <a:lstStyle/>
-                    <a:p>
-                      <a:endParaRPr lang="en-IN" sz="1600" dirty="0"/>
-                    </a:p>
-                  </a:txBody>
-                  <a:tcPr marL="94305" marR="94305"/>
-                </a:tc>
-                <a:tc>
-                  <a:txBody>
-                    <a:bodyPr/>
-                    <a:lstStyle/>
-                    <a:p>
-                      <a:endParaRPr lang="en-IN" sz="1600" dirty="0"/>
-                    </a:p>
-                  </a:txBody>
-                  <a:tcPr marL="94305" marR="94305"/>
-                </a:tc>
-              </a:tr>
             </a:tbl>
           </a:graphicData>
         </a:graphic>
@@ -8538,7 +8511,6 @@
               <a:rPr lang="en-IN" sz="2000" u="sng" dirty="0"/>
               <a:t>Login</a:t>
             </a:r>
-            <a:endParaRPr lang="en-IN" sz="2000" u="sng" dirty="0"/>
           </a:p>
         </p:txBody>
       </p:sp>

</xml_diff>